<commit_message>
changed map background to white
</commit_message>
<xml_diff>
--- a/app/data/map/Maps.pptx
+++ b/app/data/map/Maps.pptx
@@ -197,7 +197,7 @@
           <a:p>
             <a:fld id="{0309924C-CD19-A047-830F-17A1EAA49580}" type="datetimeFigureOut">
               <a:rPr lang="en-US" smtClean="0"/>
-              <a:t>10/23/18</a:t>
+              <a:t>10/24/18</a:t>
             </a:fld>
             <a:endParaRPr lang="en-US"/>
           </a:p>
@@ -1190,7 +1190,7 @@
           <a:p>
             <a:fld id="{D058F9EE-1AF1-7644-BE25-6EBEEE1EC67D}" type="datetimeFigureOut">
               <a:rPr lang="en-US" smtClean="0"/>
-              <a:t>10/23/18</a:t>
+              <a:t>10/24/18</a:t>
             </a:fld>
             <a:endParaRPr lang="en-US"/>
           </a:p>
@@ -1360,7 +1360,7 @@
           <a:p>
             <a:fld id="{D058F9EE-1AF1-7644-BE25-6EBEEE1EC67D}" type="datetimeFigureOut">
               <a:rPr lang="en-US" smtClean="0"/>
-              <a:t>10/23/18</a:t>
+              <a:t>10/24/18</a:t>
             </a:fld>
             <a:endParaRPr lang="en-US"/>
           </a:p>
@@ -1540,7 +1540,7 @@
           <a:p>
             <a:fld id="{D058F9EE-1AF1-7644-BE25-6EBEEE1EC67D}" type="datetimeFigureOut">
               <a:rPr lang="en-US" smtClean="0"/>
-              <a:t>10/23/18</a:t>
+              <a:t>10/24/18</a:t>
             </a:fld>
             <a:endParaRPr lang="en-US"/>
           </a:p>
@@ -1710,7 +1710,7 @@
           <a:p>
             <a:fld id="{D058F9EE-1AF1-7644-BE25-6EBEEE1EC67D}" type="datetimeFigureOut">
               <a:rPr lang="en-US" smtClean="0"/>
-              <a:t>10/23/18</a:t>
+              <a:t>10/24/18</a:t>
             </a:fld>
             <a:endParaRPr lang="en-US"/>
           </a:p>
@@ -1956,7 +1956,7 @@
           <a:p>
             <a:fld id="{D058F9EE-1AF1-7644-BE25-6EBEEE1EC67D}" type="datetimeFigureOut">
               <a:rPr lang="en-US" smtClean="0"/>
-              <a:t>10/23/18</a:t>
+              <a:t>10/24/18</a:t>
             </a:fld>
             <a:endParaRPr lang="en-US"/>
           </a:p>
@@ -2244,7 +2244,7 @@
           <a:p>
             <a:fld id="{D058F9EE-1AF1-7644-BE25-6EBEEE1EC67D}" type="datetimeFigureOut">
               <a:rPr lang="en-US" smtClean="0"/>
-              <a:t>10/23/18</a:t>
+              <a:t>10/24/18</a:t>
             </a:fld>
             <a:endParaRPr lang="en-US"/>
           </a:p>
@@ -2666,7 +2666,7 @@
           <a:p>
             <a:fld id="{D058F9EE-1AF1-7644-BE25-6EBEEE1EC67D}" type="datetimeFigureOut">
               <a:rPr lang="en-US" smtClean="0"/>
-              <a:t>10/23/18</a:t>
+              <a:t>10/24/18</a:t>
             </a:fld>
             <a:endParaRPr lang="en-US"/>
           </a:p>
@@ -2784,7 +2784,7 @@
           <a:p>
             <a:fld id="{D058F9EE-1AF1-7644-BE25-6EBEEE1EC67D}" type="datetimeFigureOut">
               <a:rPr lang="en-US" smtClean="0"/>
-              <a:t>10/23/18</a:t>
+              <a:t>10/24/18</a:t>
             </a:fld>
             <a:endParaRPr lang="en-US"/>
           </a:p>
@@ -2879,7 +2879,7 @@
           <a:p>
             <a:fld id="{D058F9EE-1AF1-7644-BE25-6EBEEE1EC67D}" type="datetimeFigureOut">
               <a:rPr lang="en-US" smtClean="0"/>
-              <a:t>10/23/18</a:t>
+              <a:t>10/24/18</a:t>
             </a:fld>
             <a:endParaRPr lang="en-US"/>
           </a:p>
@@ -3156,7 +3156,7 @@
           <a:p>
             <a:fld id="{D058F9EE-1AF1-7644-BE25-6EBEEE1EC67D}" type="datetimeFigureOut">
               <a:rPr lang="en-US" smtClean="0"/>
-              <a:t>10/23/18</a:t>
+              <a:t>10/24/18</a:t>
             </a:fld>
             <a:endParaRPr lang="en-US"/>
           </a:p>
@@ -3409,7 +3409,7 @@
           <a:p>
             <a:fld id="{D058F9EE-1AF1-7644-BE25-6EBEEE1EC67D}" type="datetimeFigureOut">
               <a:rPr lang="en-US" smtClean="0"/>
-              <a:t>10/23/18</a:t>
+              <a:t>10/24/18</a:t>
             </a:fld>
             <a:endParaRPr lang="en-US"/>
           </a:p>
@@ -3622,7 +3622,7 @@
           <a:p>
             <a:fld id="{D058F9EE-1AF1-7644-BE25-6EBEEE1EC67D}" type="datetimeFigureOut">
               <a:rPr lang="en-US" smtClean="0"/>
-              <a:t>10/23/18</a:t>
+              <a:t>10/24/18</a:t>
             </a:fld>
             <a:endParaRPr lang="en-US"/>
           </a:p>
@@ -4008,6 +4008,15 @@
         <p:blipFill>
           <a:blip r:embed="rId3">
             <a:extLst>
+              <a:ext uri="{BEBA8EAE-BF5A-486C-A8C5-ECC9F3942E4B}">
+                <a14:imgProps xmlns:a14="http://schemas.microsoft.com/office/drawing/2010/main">
+                  <a14:imgLayer r:embed="rId4">
+                    <a14:imgEffect>
+                      <a14:backgroundRemoval t="0" b="97263" l="0" r="100000"/>
+                    </a14:imgEffect>
+                  </a14:imgLayer>
+                </a14:imgProps>
+              </a:ext>
               <a:ext uri="{28A0092B-C50C-407E-A947-70E740481C1C}">
                 <a14:useLocalDpi xmlns:a14="http://schemas.microsoft.com/office/drawing/2010/main" val="0"/>
               </a:ext>
@@ -5364,7 +5373,7 @@
       </p:grpSpPr>
       <p:pic>
         <p:nvPicPr>
-          <p:cNvPr id="7" name="Picture 6" descr="Stadium Map.png"/>
+          <p:cNvPr id="28" name="Picture 27" descr="Stadium Map.png"/>
           <p:cNvPicPr>
             <a:picLocks noChangeAspect="1"/>
           </p:cNvPicPr>
@@ -5373,6 +5382,15 @@
         <p:blipFill>
           <a:blip r:embed="rId3">
             <a:extLst>
+              <a:ext uri="{BEBA8EAE-BF5A-486C-A8C5-ECC9F3942E4B}">
+                <a14:imgProps xmlns:a14="http://schemas.microsoft.com/office/drawing/2010/main">
+                  <a14:imgLayer r:embed="rId4">
+                    <a14:imgEffect>
+                      <a14:backgroundRemoval t="0" b="97263" l="0" r="100000"/>
+                    </a14:imgEffect>
+                  </a14:imgLayer>
+                </a14:imgProps>
+              </a:ext>
               <a:ext uri="{28A0092B-C50C-407E-A947-70E740481C1C}">
                 <a14:useLocalDpi xmlns:a14="http://schemas.microsoft.com/office/drawing/2010/main" val="0"/>
               </a:ext>
@@ -6504,7 +6522,7 @@
       </p:grpSpPr>
       <p:pic>
         <p:nvPicPr>
-          <p:cNvPr id="7" name="Picture 6" descr="Stadium Map.png"/>
+          <p:cNvPr id="58" name="Picture 57" descr="Stadium Map.png"/>
           <p:cNvPicPr>
             <a:picLocks noChangeAspect="1"/>
           </p:cNvPicPr>
@@ -6513,6 +6531,15 @@
         <p:blipFill>
           <a:blip r:embed="rId3">
             <a:extLst>
+              <a:ext uri="{BEBA8EAE-BF5A-486C-A8C5-ECC9F3942E4B}">
+                <a14:imgProps xmlns:a14="http://schemas.microsoft.com/office/drawing/2010/main">
+                  <a14:imgLayer r:embed="rId4">
+                    <a14:imgEffect>
+                      <a14:backgroundRemoval t="0" b="97263" l="0" r="100000"/>
+                    </a14:imgEffect>
+                  </a14:imgLayer>
+                </a14:imgProps>
+              </a:ext>
               <a:ext uri="{28A0092B-C50C-407E-A947-70E740481C1C}">
                 <a14:useLocalDpi xmlns:a14="http://schemas.microsoft.com/office/drawing/2010/main" val="0"/>
               </a:ext>
@@ -8949,7 +8976,7 @@
       </p:grpSpPr>
       <p:pic>
         <p:nvPicPr>
-          <p:cNvPr id="7" name="Picture 6" descr="Stadium Map.png"/>
+          <p:cNvPr id="42" name="Picture 41" descr="Stadium Map.png"/>
           <p:cNvPicPr>
             <a:picLocks noChangeAspect="1"/>
           </p:cNvPicPr>
@@ -8958,6 +8985,15 @@
         <p:blipFill>
           <a:blip r:embed="rId3">
             <a:extLst>
+              <a:ext uri="{BEBA8EAE-BF5A-486C-A8C5-ECC9F3942E4B}">
+                <a14:imgProps xmlns:a14="http://schemas.microsoft.com/office/drawing/2010/main">
+                  <a14:imgLayer r:embed="rId4">
+                    <a14:imgEffect>
+                      <a14:backgroundRemoval t="0" b="97263" l="0" r="100000"/>
+                    </a14:imgEffect>
+                  </a14:imgLayer>
+                </a14:imgProps>
+              </a:ext>
               <a:ext uri="{28A0092B-C50C-407E-A947-70E740481C1C}">
                 <a14:useLocalDpi xmlns:a14="http://schemas.microsoft.com/office/drawing/2010/main" val="0"/>
               </a:ext>
@@ -10764,7 +10800,7 @@
       </p:grpSpPr>
       <p:pic>
         <p:nvPicPr>
-          <p:cNvPr id="7" name="Picture 6" descr="Stadium Map.png"/>
+          <p:cNvPr id="24" name="Picture 23" descr="Stadium Map.png"/>
           <p:cNvPicPr>
             <a:picLocks noChangeAspect="1"/>
           </p:cNvPicPr>
@@ -10773,6 +10809,15 @@
         <p:blipFill>
           <a:blip r:embed="rId3">
             <a:extLst>
+              <a:ext uri="{BEBA8EAE-BF5A-486C-A8C5-ECC9F3942E4B}">
+                <a14:imgProps xmlns:a14="http://schemas.microsoft.com/office/drawing/2010/main">
+                  <a14:imgLayer r:embed="rId4">
+                    <a14:imgEffect>
+                      <a14:backgroundRemoval t="0" b="97263" l="0" r="100000"/>
+                    </a14:imgEffect>
+                  </a14:imgLayer>
+                </a14:imgProps>
+              </a:ext>
               <a:ext uri="{28A0092B-C50C-407E-A947-70E740481C1C}">
                 <a14:useLocalDpi xmlns:a14="http://schemas.microsoft.com/office/drawing/2010/main" val="0"/>
               </a:ext>
@@ -11769,7 +11814,7 @@
       </p:grpSpPr>
       <p:pic>
         <p:nvPicPr>
-          <p:cNvPr id="7" name="Picture 6" descr="Stadium Map.png"/>
+          <p:cNvPr id="54" name="Picture 53" descr="Stadium Map.png"/>
           <p:cNvPicPr>
             <a:picLocks noChangeAspect="1"/>
           </p:cNvPicPr>
@@ -11778,6 +11823,15 @@
         <p:blipFill>
           <a:blip r:embed="rId3">
             <a:extLst>
+              <a:ext uri="{BEBA8EAE-BF5A-486C-A8C5-ECC9F3942E4B}">
+                <a14:imgProps xmlns:a14="http://schemas.microsoft.com/office/drawing/2010/main">
+                  <a14:imgLayer r:embed="rId4">
+                    <a14:imgEffect>
+                      <a14:backgroundRemoval t="0" b="97263" l="0" r="100000"/>
+                    </a14:imgEffect>
+                  </a14:imgLayer>
+                </a14:imgProps>
+              </a:ext>
               <a:ext uri="{28A0092B-C50C-407E-A947-70E740481C1C}">
                 <a14:useLocalDpi xmlns:a14="http://schemas.microsoft.com/office/drawing/2010/main" val="0"/>
               </a:ext>

</xml_diff>